<commit_message>
Support for 'yield from' (EXPERIMENTAL)
</commit_message>
<xml_diff>
--- a/transcrypt/docs/images/workflow.pptx
+++ b/transcrypt/docs/images/workflow.pptx
@@ -289,7 +289,7 @@
             <a:fld id="{8638F0FA-503B-447F-A02E-6BF1D880434F}" type="datetimeFigureOut">
               <a:rPr lang="nl-NL" smtClean="0"/>
               <a:pPr/>
-              <a:t>11-7-2016</a:t>
+              <a:t>15-11-2016</a:t>
             </a:fld>
             <a:endParaRPr lang="nl-NL"/>
           </a:p>
@@ -456,7 +456,7 @@
             <a:fld id="{8638F0FA-503B-447F-A02E-6BF1D880434F}" type="datetimeFigureOut">
               <a:rPr lang="nl-NL" smtClean="0"/>
               <a:pPr/>
-              <a:t>11-7-2016</a:t>
+              <a:t>15-11-2016</a:t>
             </a:fld>
             <a:endParaRPr lang="nl-NL"/>
           </a:p>
@@ -633,7 +633,7 @@
             <a:fld id="{8638F0FA-503B-447F-A02E-6BF1D880434F}" type="datetimeFigureOut">
               <a:rPr lang="nl-NL" smtClean="0"/>
               <a:pPr/>
-              <a:t>11-7-2016</a:t>
+              <a:t>15-11-2016</a:t>
             </a:fld>
             <a:endParaRPr lang="nl-NL"/>
           </a:p>
@@ -800,7 +800,7 @@
             <a:fld id="{8638F0FA-503B-447F-A02E-6BF1D880434F}" type="datetimeFigureOut">
               <a:rPr lang="nl-NL" smtClean="0"/>
               <a:pPr/>
-              <a:t>11-7-2016</a:t>
+              <a:t>15-11-2016</a:t>
             </a:fld>
             <a:endParaRPr lang="nl-NL"/>
           </a:p>
@@ -1043,7 +1043,7 @@
             <a:fld id="{8638F0FA-503B-447F-A02E-6BF1D880434F}" type="datetimeFigureOut">
               <a:rPr lang="nl-NL" smtClean="0"/>
               <a:pPr/>
-              <a:t>11-7-2016</a:t>
+              <a:t>15-11-2016</a:t>
             </a:fld>
             <a:endParaRPr lang="nl-NL"/>
           </a:p>
@@ -1328,7 +1328,7 @@
             <a:fld id="{8638F0FA-503B-447F-A02E-6BF1D880434F}" type="datetimeFigureOut">
               <a:rPr lang="nl-NL" smtClean="0"/>
               <a:pPr/>
-              <a:t>11-7-2016</a:t>
+              <a:t>15-11-2016</a:t>
             </a:fld>
             <a:endParaRPr lang="nl-NL"/>
           </a:p>
@@ -1747,7 +1747,7 @@
             <a:fld id="{8638F0FA-503B-447F-A02E-6BF1D880434F}" type="datetimeFigureOut">
               <a:rPr lang="nl-NL" smtClean="0"/>
               <a:pPr/>
-              <a:t>11-7-2016</a:t>
+              <a:t>15-11-2016</a:t>
             </a:fld>
             <a:endParaRPr lang="nl-NL"/>
           </a:p>
@@ -1862,7 +1862,7 @@
             <a:fld id="{8638F0FA-503B-447F-A02E-6BF1D880434F}" type="datetimeFigureOut">
               <a:rPr lang="nl-NL" smtClean="0"/>
               <a:pPr/>
-              <a:t>11-7-2016</a:t>
+              <a:t>15-11-2016</a:t>
             </a:fld>
             <a:endParaRPr lang="nl-NL"/>
           </a:p>
@@ -1954,7 +1954,7 @@
             <a:fld id="{8638F0FA-503B-447F-A02E-6BF1D880434F}" type="datetimeFigureOut">
               <a:rPr lang="nl-NL" smtClean="0"/>
               <a:pPr/>
-              <a:t>11-7-2016</a:t>
+              <a:t>15-11-2016</a:t>
             </a:fld>
             <a:endParaRPr lang="nl-NL"/>
           </a:p>
@@ -2228,7 +2228,7 @@
             <a:fld id="{8638F0FA-503B-447F-A02E-6BF1D880434F}" type="datetimeFigureOut">
               <a:rPr lang="nl-NL" smtClean="0"/>
               <a:pPr/>
-              <a:t>11-7-2016</a:t>
+              <a:t>15-11-2016</a:t>
             </a:fld>
             <a:endParaRPr lang="nl-NL"/>
           </a:p>
@@ -2478,7 +2478,7 @@
             <a:fld id="{8638F0FA-503B-447F-A02E-6BF1D880434F}" type="datetimeFigureOut">
               <a:rPr lang="nl-NL" smtClean="0"/>
               <a:pPr/>
-              <a:t>11-7-2016</a:t>
+              <a:t>15-11-2016</a:t>
             </a:fld>
             <a:endParaRPr lang="nl-NL"/>
           </a:p>
@@ -2688,7 +2688,7 @@
             <a:fld id="{8638F0FA-503B-447F-A02E-6BF1D880434F}" type="datetimeFigureOut">
               <a:rPr lang="nl-NL" smtClean="0"/>
               <a:pPr/>
-              <a:t>11-7-2016</a:t>
+              <a:t>15-11-2016</a:t>
             </a:fld>
             <a:endParaRPr lang="nl-NL"/>
           </a:p>
@@ -3095,7 +3095,15 @@
           <a:p>
             <a:r>
               <a:rPr lang="en-US" smtClean="0"/>
-              <a:t>Install Python 3.5 from www.python.org</a:t>
+              <a:t>Install Python 3.5 </a:t>
+            </a:r>
+            <a:r>
+              <a:rPr lang="en-US" smtClean="0"/>
+              <a:t>or 3.6 from </a:t>
+            </a:r>
+            <a:r>
+              <a:rPr lang="en-US" smtClean="0"/>
+              <a:t>www.python.org</a:t>
             </a:r>
           </a:p>
           <a:p>

</xml_diff>